<commit_message>
Minor updated to D2 slides
</commit_message>
<xml_diff>
--- a/slides/day 2/D2C1_ANN.pptx
+++ b/slides/day 2/D2C1_ANN.pptx
@@ -213,7 +213,7 @@
           <a:p>
             <a:fld id="{FF5685EE-3D40-0A4E-BB88-46887330FC0A}" type="datetimeFigureOut">
               <a:rPr lang="en-US" smtClean="0"/>
-              <a:t>9/24/25</a:t>
+              <a:t>9/25/25</a:t>
             </a:fld>
             <a:endParaRPr lang="en-US"/>
           </a:p>
@@ -595,7 +595,7 @@
             <a:fld id="{16F2FB5F-D553-C945-B874-A642CC0C851F}" type="datetime3">
               <a:rPr lang="en-IE" smtClean="0"/>
               <a:pPr/>
-              <a:t>24 September 2025</a:t>
+              <a:t>25 September 2025</a:t>
             </a:fld>
             <a:endParaRPr lang="en-US" dirty="0"/>
           </a:p>
@@ -1450,7 +1450,7 @@
             <a:fld id="{16F2FB5F-D553-C945-B874-A642CC0C851F}" type="datetime3">
               <a:rPr lang="en-IE" smtClean="0"/>
               <a:pPr/>
-              <a:t>24 September 2025</a:t>
+              <a:t>25 September 2025</a:t>
             </a:fld>
             <a:endParaRPr lang="en-US" dirty="0"/>
           </a:p>
@@ -1725,7 +1725,7 @@
             <a:fld id="{16F2FB5F-D553-C945-B874-A642CC0C851F}" type="datetime3">
               <a:rPr lang="en-IE" smtClean="0"/>
               <a:pPr/>
-              <a:t>24 September 2025</a:t>
+              <a:t>25 September 2025</a:t>
             </a:fld>
             <a:endParaRPr lang="en-US" dirty="0"/>
           </a:p>
@@ -1900,7 +1900,7 @@
           <a:p>
             <a:fld id="{BEF41344-4D35-F145-B477-F6239A2130EE}" type="datetime3">
               <a:rPr lang="en-IE" smtClean="0"/>
-              <a:t>24 September 2025</a:t>
+              <a:t>25 September 2025</a:t>
             </a:fld>
             <a:endParaRPr lang="en-US"/>
           </a:p>
@@ -2176,7 +2176,7 @@
           <a:p>
             <a:fld id="{07196900-CA2A-2D43-9641-C5C0DD2D22D3}" type="datetime3">
               <a:rPr lang="en-IE" smtClean="0"/>
-              <a:t>24 September 2025</a:t>
+              <a:t>25 September 2025</a:t>
             </a:fld>
             <a:endParaRPr lang="en-US"/>
           </a:p>
@@ -2444,7 +2444,7 @@
           <a:p>
             <a:fld id="{8AB1A910-F8E0-D541-83F2-2CFD6E718762}" type="datetime3">
               <a:rPr lang="en-IE" smtClean="0"/>
-              <a:t>24 September 2025</a:t>
+              <a:t>25 September 2025</a:t>
             </a:fld>
             <a:endParaRPr lang="en-US"/>
           </a:p>
@@ -2586,7 +2586,7 @@
           <a:p>
             <a:fld id="{7E245B59-D3F3-5B43-BDD1-6C7B7CFD2AA6}" type="datetime3">
               <a:rPr lang="en-IE" smtClean="0"/>
-              <a:t>24 September 2025</a:t>
+              <a:t>25 September 2025</a:t>
             </a:fld>
             <a:endParaRPr lang="en-US"/>
           </a:p>
@@ -2699,7 +2699,7 @@
           <a:p>
             <a:fld id="{AD77DDCF-3644-8C44-AE36-2C59F897E125}" type="datetime3">
               <a:rPr lang="en-IE" smtClean="0"/>
-              <a:t>24 September 2025</a:t>
+              <a:t>25 September 2025</a:t>
             </a:fld>
             <a:endParaRPr lang="en-US"/>
           </a:p>
@@ -3110,7 +3110,7 @@
           <a:p>
             <a:fld id="{C1B28D5F-B017-3B47-9775-DA319F6143FF}" type="datetime3">
               <a:rPr lang="en-IE" smtClean="0"/>
-              <a:t>24 September 2025</a:t>
+              <a:t>25 September 2025</a:t>
             </a:fld>
             <a:endParaRPr lang="en-US" dirty="0"/>
           </a:p>

</xml_diff>

<commit_message>
Small updates to day 2
</commit_message>
<xml_diff>
--- a/slides/day 2/D2C1_ANN.pptx
+++ b/slides/day 2/D2C1_ANN.pptx
@@ -213,7 +213,7 @@
           <a:p>
             <a:fld id="{FF5685EE-3D40-0A4E-BB88-46887330FC0A}" type="datetimeFigureOut">
               <a:rPr lang="en-US" smtClean="0"/>
-              <a:t>10/4/2025</a:t>
+              <a:t>10/6/25</a:t>
             </a:fld>
             <a:endParaRPr lang="en-US"/>
           </a:p>
@@ -595,7 +595,7 @@
             <a:fld id="{16F2FB5F-D553-C945-B874-A642CC0C851F}" type="datetime3">
               <a:rPr lang="en-IE" smtClean="0"/>
               <a:pPr/>
-              <a:t>4 October 2025</a:t>
+              <a:t>6 October 2025</a:t>
             </a:fld>
             <a:endParaRPr lang="en-US" dirty="0"/>
           </a:p>
@@ -1450,7 +1450,7 @@
             <a:fld id="{16F2FB5F-D553-C945-B874-A642CC0C851F}" type="datetime3">
               <a:rPr lang="en-IE" smtClean="0"/>
               <a:pPr/>
-              <a:t>4 October 2025</a:t>
+              <a:t>6 October 2025</a:t>
             </a:fld>
             <a:endParaRPr lang="en-US" dirty="0"/>
           </a:p>
@@ -1725,7 +1725,7 @@
             <a:fld id="{16F2FB5F-D553-C945-B874-A642CC0C851F}" type="datetime3">
               <a:rPr lang="en-IE" smtClean="0"/>
               <a:pPr/>
-              <a:t>4 October 2025</a:t>
+              <a:t>6 October 2025</a:t>
             </a:fld>
             <a:endParaRPr lang="en-US" dirty="0"/>
           </a:p>
@@ -1900,7 +1900,7 @@
           <a:p>
             <a:fld id="{BEF41344-4D35-F145-B477-F6239A2130EE}" type="datetime3">
               <a:rPr lang="en-IE" smtClean="0"/>
-              <a:t>4 October 2025</a:t>
+              <a:t>6 October 2025</a:t>
             </a:fld>
             <a:endParaRPr lang="en-US"/>
           </a:p>
@@ -2176,7 +2176,7 @@
           <a:p>
             <a:fld id="{07196900-CA2A-2D43-9641-C5C0DD2D22D3}" type="datetime3">
               <a:rPr lang="en-IE" smtClean="0"/>
-              <a:t>4 October 2025</a:t>
+              <a:t>6 October 2025</a:t>
             </a:fld>
             <a:endParaRPr lang="en-US"/>
           </a:p>
@@ -2444,7 +2444,7 @@
           <a:p>
             <a:fld id="{8AB1A910-F8E0-D541-83F2-2CFD6E718762}" type="datetime3">
               <a:rPr lang="en-IE" smtClean="0"/>
-              <a:t>4 October 2025</a:t>
+              <a:t>6 October 2025</a:t>
             </a:fld>
             <a:endParaRPr lang="en-US"/>
           </a:p>
@@ -2586,7 +2586,7 @@
           <a:p>
             <a:fld id="{7E245B59-D3F3-5B43-BDD1-6C7B7CFD2AA6}" type="datetime3">
               <a:rPr lang="en-IE" smtClean="0"/>
-              <a:t>4 October 2025</a:t>
+              <a:t>6 October 2025</a:t>
             </a:fld>
             <a:endParaRPr lang="en-US"/>
           </a:p>
@@ -2699,7 +2699,7 @@
           <a:p>
             <a:fld id="{AD77DDCF-3644-8C44-AE36-2C59F897E125}" type="datetime3">
               <a:rPr lang="en-IE" smtClean="0"/>
-              <a:t>4 October 2025</a:t>
+              <a:t>6 October 2025</a:t>
             </a:fld>
             <a:endParaRPr lang="en-US"/>
           </a:p>
@@ -3110,7 +3110,7 @@
           <a:p>
             <a:fld id="{C1B28D5F-B017-3B47-9775-DA319F6143FF}" type="datetime3">
               <a:rPr lang="en-IE" smtClean="0"/>
-              <a:t>4 October 2025</a:t>
+              <a:t>6 October 2025</a:t>
             </a:fld>
             <a:endParaRPr lang="en-US" dirty="0"/>
           </a:p>
@@ -4049,6 +4049,22 @@
               <a:rPr dirty="0"/>
               <a:t>Later epochs just refine the pattern.</a:t>
             </a:r>
+            <a:endParaRPr lang="en-IE" dirty="0"/>
+          </a:p>
+          <a:p>
+            <a:r>
+              <a:rPr lang="en-IE" dirty="0"/>
+              <a:t>(</a:t>
+            </a:r>
+            <a:r>
+              <a:rPr lang="en-IE" dirty="0" err="1"/>
+              <a:t>wandb</a:t>
+            </a:r>
+            <a:r>
+              <a:rPr lang="en-IE" dirty="0"/>
+              <a:t> package useful for monitoring runs)</a:t>
+            </a:r>
+            <a:endParaRPr dirty="0"/>
           </a:p>
         </p:txBody>
       </p:sp>
@@ -4495,7 +4511,7 @@
           <a:p>
             <a:r>
               <a:rPr lang="en-IE" dirty="0"/>
-              <a:t>A simpler version to this will be Q1 of the exam!</a:t>
+              <a:t>A simpler version to this (with derivatives given) will be on the exam!</a:t>
             </a:r>
             <a:endParaRPr dirty="0"/>
           </a:p>
@@ -10074,13 +10090,7 @@
                                   <a:rPr lang="en-IE" b="0" i="1" smtClean="0">
                                     <a:latin typeface="Cambria Math" panose="02040503050406030204" pitchFamily="18" charset="0"/>
                                   </a:rPr>
-                                  <m:t>−</m:t>
-                                </m:r>
-                                <m:r>
-                                  <a:rPr lang="en-IE" b="0" i="1" smtClean="0">
-                                    <a:latin typeface="Cambria Math" panose="02040503050406030204" pitchFamily="18" charset="0"/>
-                                  </a:rPr>
-                                  <m:t>1</m:t>
+                                  <m:t>−1</m:t>
                                 </m:r>
                               </m:e>
                               <m:e>
@@ -10098,13 +10108,7 @@
                                   <a:rPr lang="en-IE" b="0" i="1" smtClean="0">
                                     <a:latin typeface="Cambria Math" panose="02040503050406030204" pitchFamily="18" charset="0"/>
                                   </a:rPr>
-                                  <m:t>−</m:t>
-                                </m:r>
-                                <m:r>
-                                  <a:rPr lang="en-IE" b="0" i="1" smtClean="0">
-                                    <a:latin typeface="Cambria Math" panose="02040503050406030204" pitchFamily="18" charset="0"/>
-                                  </a:rPr>
-                                  <m:t>2</m:t>
+                                  <m:t>−2</m:t>
                                 </m:r>
                               </m:e>
                               <m:e>
@@ -10371,8 +10375,8 @@
           </a:p>
         </p:txBody>
       </p:sp>
-      <mc:AlternateContent xmlns:mc="http://schemas.openxmlformats.org/markup-compatibility/2006">
-        <mc:Choice xmlns:a14="http://schemas.microsoft.com/office/drawing/2010/main" Requires="a14">
+      <mc:AlternateContent xmlns:mc="http://schemas.openxmlformats.org/markup-compatibility/2006" xmlns:a14="http://schemas.microsoft.com/office/drawing/2010/main">
+        <mc:Choice Requires="a14">
           <p:sp>
             <p:nvSpPr>
               <p:cNvPr id="3" name="Content Placeholder 2"/>
@@ -10469,19 +10473,7 @@
                         <a:rPr lang="ar-AE" sz="2400" i="1" dirty="0">
                           <a:latin typeface="Cambria Math" panose="02040503050406030204" pitchFamily="18" charset="0"/>
                         </a:rPr>
-                        <m:t>) + (</m:t>
-                      </m:r>
-                      <m:r>
-                        <a:rPr lang="ar-AE" sz="2400" i="1" dirty="0">
-                          <a:latin typeface="Cambria Math" panose="02040503050406030204" pitchFamily="18" charset="0"/>
-                        </a:rPr>
-                        <m:t>1</m:t>
-                      </m:r>
-                      <m:r>
-                        <a:rPr lang="ar-AE" sz="2400" i="1" dirty="0">
-                          <a:latin typeface="Cambria Math" panose="02040503050406030204" pitchFamily="18" charset="0"/>
-                        </a:rPr>
-                        <m:t>−</m:t>
+                        <m:t>) + (1−</m:t>
                       </m:r>
                       <m:r>
                         <a:rPr lang="ar-AE" sz="2400" i="1" dirty="0">
@@ -10508,19 +10500,7 @@
                         <a:rPr lang="en-IE" sz="2400" i="1" dirty="0">
                           <a:latin typeface="Cambria Math" panose="02040503050406030204" pitchFamily="18" charset="0"/>
                         </a:rPr>
-                        <m:t>⁡(</m:t>
-                      </m:r>
-                      <m:r>
-                        <a:rPr lang="en-IE" sz="2400" i="1" dirty="0">
-                          <a:latin typeface="Cambria Math" panose="02040503050406030204" pitchFamily="18" charset="0"/>
-                        </a:rPr>
-                        <m:t>1</m:t>
-                      </m:r>
-                      <m:r>
-                        <a:rPr lang="en-IE" sz="2400" i="1" dirty="0">
-                          <a:latin typeface="Cambria Math" panose="02040503050406030204" pitchFamily="18" charset="0"/>
-                        </a:rPr>
-                        <m:t> −</m:t>
+                        <m:t>⁡(1 −</m:t>
                       </m:r>
                       <m:acc>
                         <m:accPr>
@@ -10587,7 +10567,7 @@
             </p:txBody>
           </p:sp>
         </mc:Choice>
-        <mc:Fallback>
+        <mc:Fallback xmlns="">
           <p:sp>
             <p:nvSpPr>
               <p:cNvPr id="3" name="Content Placeholder 2"/>

</xml_diff>